<commit_message>
Update der Präsi und des Posters
</commit_message>
<xml_diff>
--- a/Bachelor/Präsentation Bachelor.pptx
+++ b/Bachelor/Präsentation Bachelor.pptx
@@ -202,7 +202,7 @@
           <a:p>
             <a:fld id="{D13AFE29-CA10-4DFC-BB72-78DA4D25FD73}" type="datetimeFigureOut">
               <a:rPr lang="de-DE" smtClean="0"/>
-              <a:t>16.08.2017</a:t>
+              <a:t>29.08.2017</a:t>
             </a:fld>
             <a:endParaRPr lang="de-DE"/>
           </a:p>
@@ -1515,7 +1515,7 @@
           <a:p>
             <a:r>
               <a:rPr lang="de-DE" smtClean="0"/>
-              <a:t>28.11.2016</a:t>
+              <a:t>01.09.2017</a:t>
             </a:r>
             <a:endParaRPr lang="de-DE" dirty="0"/>
           </a:p>
@@ -1715,7 +1715,7 @@
           <a:p>
             <a:r>
               <a:rPr lang="de-DE" smtClean="0"/>
-              <a:t>28.11.2016</a:t>
+              <a:t>01.09.2017</a:t>
             </a:r>
             <a:endParaRPr lang="de-DE"/>
           </a:p>
@@ -1904,7 +1904,7 @@
           <a:p>
             <a:r>
               <a:rPr lang="de-DE" smtClean="0"/>
-              <a:t>28.11.2016</a:t>
+              <a:t>01.09.2017</a:t>
             </a:r>
             <a:endParaRPr lang="de-DE"/>
           </a:p>
@@ -2053,14 +2053,17 @@
         <p:txBody>
           <a:bodyPr/>
           <a:lstStyle>
+            <a:lvl1pPr>
+              <a:defRPr/>
+            </a:lvl1pPr>
             <a:extLst/>
           </a:lstStyle>
           <a:p>
             <a:r>
               <a:rPr lang="de-DE" smtClean="0"/>
-              <a:t>28.11.2016</a:t>
-            </a:r>
-            <a:endParaRPr lang="de-DE"/>
+              <a:t>01.09.2017</a:t>
+            </a:r>
+            <a:endParaRPr lang="de-DE" dirty="0"/>
           </a:p>
         </p:txBody>
       </p:sp>
@@ -2317,7 +2320,7 @@
           <a:p>
             <a:r>
               <a:rPr lang="de-DE" smtClean="0"/>
-              <a:t>28.11.2016</a:t>
+              <a:t>01.09.2017</a:t>
             </a:r>
             <a:endParaRPr lang="de-DE"/>
           </a:p>
@@ -2730,7 +2733,7 @@
           <a:p>
             <a:r>
               <a:rPr lang="de-DE" smtClean="0"/>
-              <a:t>28.11.2016</a:t>
+              <a:t>01.09.2017</a:t>
             </a:r>
             <a:endParaRPr lang="de-DE"/>
           </a:p>
@@ -3180,7 +3183,7 @@
           <a:p>
             <a:r>
               <a:rPr lang="de-DE" smtClean="0"/>
-              <a:t>28.11.2016</a:t>
+              <a:t>01.09.2017</a:t>
             </a:r>
             <a:endParaRPr lang="de-DE"/>
           </a:p>
@@ -3285,7 +3288,7 @@
           <a:p>
             <a:r>
               <a:rPr lang="de-DE" smtClean="0"/>
-              <a:t>28.11.2016</a:t>
+              <a:t>01.09.2017</a:t>
             </a:r>
             <a:endParaRPr lang="de-DE"/>
           </a:p>
@@ -3410,7 +3413,7 @@
           <a:p>
             <a:r>
               <a:rPr lang="de-DE" smtClean="0"/>
-              <a:t>28.11.2016</a:t>
+              <a:t>01.09.2017</a:t>
             </a:r>
             <a:endParaRPr lang="de-DE"/>
           </a:p>
@@ -3688,7 +3691,7 @@
           <a:p>
             <a:r>
               <a:rPr lang="de-DE" smtClean="0"/>
-              <a:t>28.11.2016</a:t>
+              <a:t>01.09.2017</a:t>
             </a:r>
             <a:endParaRPr lang="de-DE"/>
           </a:p>
@@ -3897,7 +3900,7 @@
           <a:p>
             <a:r>
               <a:rPr lang="de-DE" smtClean="0"/>
-              <a:t>28.11.2016</a:t>
+              <a:t>01.09.2017</a:t>
             </a:r>
             <a:endParaRPr lang="de-DE"/>
           </a:p>
@@ -5010,7 +5013,7 @@
           <a:p>
             <a:r>
               <a:rPr lang="de-DE" smtClean="0"/>
-              <a:t>28.11.2016</a:t>
+              <a:t>01.09.2017</a:t>
             </a:r>
             <a:endParaRPr lang="de-DE" dirty="0"/>
           </a:p>
@@ -5560,7 +5563,7 @@
           <a:p>
             <a:r>
               <a:rPr lang="de-DE" smtClean="0"/>
-              <a:t>28.11.2016</a:t>
+              <a:t>01.09.2017</a:t>
             </a:r>
             <a:endParaRPr lang="de-DE" dirty="0"/>
           </a:p>
@@ -5587,10 +5590,22 @@
           <a:lstStyle/>
           <a:p>
             <a:r>
-              <a:rPr lang="de-DE" dirty="0" smtClean="0"/>
+              <a:rPr lang="de-DE" dirty="0" smtClean="0">
+                <a:solidFill>
+                  <a:schemeClr val="bg1">
+                    <a:lumMod val="65000"/>
+                  </a:schemeClr>
+                </a:solidFill>
+              </a:rPr>
               <a:t>Martin Schneider, 6000513</a:t>
             </a:r>
-            <a:endParaRPr lang="de-DE" dirty="0"/>
+            <a:endParaRPr lang="de-DE" dirty="0">
+              <a:solidFill>
+                <a:schemeClr val="bg1">
+                  <a:lumMod val="65000"/>
+                </a:schemeClr>
+              </a:solidFill>
+            </a:endParaRPr>
           </a:p>
         </p:txBody>
       </p:sp>
@@ -5702,7 +5717,7 @@
           <a:p>
             <a:r>
               <a:rPr lang="de-DE" smtClean="0"/>
-              <a:t>28.11.2016</a:t>
+              <a:t>01.09.2017</a:t>
             </a:r>
             <a:endParaRPr lang="de-DE" dirty="0"/>
           </a:p>
@@ -5813,6 +5828,109 @@
           </a:bodyPr>
           <a:lstStyle/>
           <a:p>
+            <a:pPr>
+              <a:spcBef>
+                <a:spcPct val="0"/>
+              </a:spcBef>
+            </a:pPr>
+            <a:r>
+              <a:rPr lang="de-DE" altLang="de-DE" sz="1600" dirty="0">
+                <a:hlinkClick r:id="rId2"/>
+              </a:rPr>
+              <a:t>http://www.iconarchive.com/show/vista-hardware-devices-icons-by-icons-land/Home-Server-icon.html</a:t>
+            </a:r>
+            <a:endParaRPr lang="de-DE" altLang="de-DE" sz="1600" dirty="0"/>
+          </a:p>
+          <a:p>
+            <a:pPr>
+              <a:spcBef>
+                <a:spcPct val="0"/>
+              </a:spcBef>
+            </a:pPr>
+            <a:r>
+              <a:rPr lang="de-DE" altLang="de-DE" sz="1600" dirty="0">
+                <a:hlinkClick r:id="rId3"/>
+              </a:rPr>
+              <a:t>http://www.iconarchive.com/show/ivista-2-icons-by-gakuseisean/Misc-Web-Database-icon.html</a:t>
+            </a:r>
+            <a:endParaRPr lang="de-DE" altLang="de-DE" sz="1600" dirty="0"/>
+          </a:p>
+          <a:p>
+            <a:pPr>
+              <a:spcBef>
+                <a:spcPct val="0"/>
+              </a:spcBef>
+            </a:pPr>
+            <a:r>
+              <a:rPr lang="de-DE" altLang="de-DE" sz="1600" dirty="0">
+                <a:hlinkClick r:id="rId4"/>
+              </a:rPr>
+              <a:t>http://www.iconarchive.com/show/ios7-icons-by-icons8/Network-Windows-Client-icon.html</a:t>
+            </a:r>
+          </a:p>
+          <a:p>
+            <a:pPr>
+              <a:spcBef>
+                <a:spcPct val="0"/>
+              </a:spcBef>
+            </a:pPr>
+            <a:r>
+              <a:rPr lang="de-DE" altLang="de-DE" sz="1600" dirty="0">
+                <a:hlinkClick r:id="rId4"/>
+              </a:rPr>
+              <a:t>http://www.iconarchive.com/show/sleek-xp-basic-icons-by-hopstarter/Clients-icon.html</a:t>
+            </a:r>
+            <a:endParaRPr lang="de-DE" altLang="de-DE" sz="1600" dirty="0"/>
+          </a:p>
+          <a:p>
+            <a:pPr>
+              <a:spcBef>
+                <a:spcPct val="0"/>
+              </a:spcBef>
+            </a:pPr>
+            <a:r>
+              <a:rPr lang="de-DE" altLang="de-DE" sz="1600" dirty="0">
+                <a:hlinkClick r:id="rId5"/>
+              </a:rPr>
+              <a:t>http://</a:t>
+            </a:r>
+            <a:r>
+              <a:rPr lang="de-DE" altLang="de-DE" sz="1600" dirty="0" smtClean="0">
+                <a:hlinkClick r:id="rId5"/>
+              </a:rPr>
+              <a:t>www.iconarchive.com/show/windows-8-icons-by-icons8/Science-Scale-icon.html</a:t>
+            </a:r>
+            <a:endParaRPr lang="de-DE" altLang="de-DE" sz="1600" dirty="0" smtClean="0"/>
+          </a:p>
+          <a:p>
+            <a:pPr>
+              <a:spcBef>
+                <a:spcPct val="0"/>
+              </a:spcBef>
+            </a:pPr>
+            <a:r>
+              <a:rPr lang="de-DE" altLang="de-DE" sz="1600" dirty="0">
+                <a:hlinkClick r:id="rId6"/>
+              </a:rPr>
+              <a:t>https://</a:t>
+            </a:r>
+            <a:r>
+              <a:rPr lang="de-DE" altLang="de-DE" sz="1600" dirty="0" smtClean="0">
+                <a:hlinkClick r:id="rId6"/>
+              </a:rPr>
+              <a:t>www.neuhold.pro/php/kapitel0</a:t>
+            </a:r>
+            <a:endParaRPr lang="de-DE" altLang="de-DE" sz="1600" dirty="0" smtClean="0"/>
+          </a:p>
+          <a:p>
+            <a:pPr>
+              <a:spcBef>
+                <a:spcPct val="0"/>
+              </a:spcBef>
+            </a:pPr>
+            <a:endParaRPr lang="de-DE" altLang="de-DE" sz="1600" dirty="0"/>
+          </a:p>
+          <a:p>
             <a:endParaRPr lang="de-DE" sz="2000" dirty="0"/>
           </a:p>
         </p:txBody>
@@ -5834,7 +5952,7 @@
           <a:p>
             <a:r>
               <a:rPr lang="de-DE" smtClean="0"/>
-              <a:t>28.11.2016</a:t>
+              <a:t>01.09.2017</a:t>
             </a:r>
             <a:endParaRPr lang="de-DE"/>
           </a:p>
@@ -6069,9 +6187,9 @@
           <a:p>
             <a:r>
               <a:rPr lang="de-DE" smtClean="0"/>
-              <a:t>28.11.2016</a:t>
-            </a:r>
-            <a:endParaRPr lang="de-DE"/>
+              <a:t>01.09.2017</a:t>
+            </a:r>
+            <a:endParaRPr lang="de-DE" dirty="0"/>
           </a:p>
         </p:txBody>
       </p:sp>
@@ -6250,9 +6368,9 @@
           <a:p>
             <a:r>
               <a:rPr lang="de-DE" smtClean="0"/>
-              <a:t>28.11.2016</a:t>
-            </a:r>
-            <a:endParaRPr lang="de-DE"/>
+              <a:t>01.09.2017</a:t>
+            </a:r>
+            <a:endParaRPr lang="de-DE" dirty="0"/>
           </a:p>
         </p:txBody>
       </p:sp>
@@ -7011,8 +7129,8 @@
           <a:lstStyle/>
           <a:p>
             <a:r>
-              <a:rPr lang="de-DE" dirty="0" smtClean="0"/>
-              <a:t>28.11.2016</a:t>
+              <a:rPr lang="de-DE" smtClean="0"/>
+              <a:t>01.09.2017</a:t>
             </a:r>
             <a:endParaRPr lang="de-DE" dirty="0"/>
           </a:p>
@@ -7454,7 +7572,7 @@
           <a:p>
             <a:r>
               <a:rPr lang="de-DE" smtClean="0"/>
-              <a:t>28.11.2016</a:t>
+              <a:t>01.09.2017</a:t>
             </a:r>
             <a:endParaRPr lang="de-DE"/>
           </a:p>
@@ -7552,7 +7670,7 @@
         </p:blipFill>
         <p:spPr bwMode="auto">
           <a:xfrm>
-            <a:off x="1331639" y="3356992"/>
+            <a:off x="899592" y="3356992"/>
             <a:ext cx="7419975" cy="1857376"/>
           </a:xfrm>
           <a:prstGeom prst="rect">
@@ -7578,7 +7696,7 @@
         </p:nvSpPr>
         <p:spPr>
           <a:xfrm>
-            <a:off x="1250529" y="5229200"/>
+            <a:off x="899592" y="5229200"/>
             <a:ext cx="4329583" cy="276999"/>
           </a:xfrm>
           <a:prstGeom prst="rect">
@@ -7730,7 +7848,7 @@
           <a:p>
             <a:r>
               <a:rPr lang="de-DE" smtClean="0"/>
-              <a:t>28.11.2016</a:t>
+              <a:t>01.09.2017</a:t>
             </a:r>
             <a:endParaRPr lang="de-DE"/>
           </a:p>
@@ -7976,6 +8094,36 @@
           <a:chExt cx="0" cy="0"/>
         </a:xfrm>
       </p:grpSpPr>
+      <p:pic>
+        <p:nvPicPr>
+          <p:cNvPr id="5" name="Grafik 4"/>
+          <p:cNvPicPr>
+            <a:picLocks noChangeAspect="1"/>
+          </p:cNvPicPr>
+          <p:nvPr/>
+        </p:nvPicPr>
+        <p:blipFill>
+          <a:blip r:embed="rId3">
+            <a:extLst>
+              <a:ext uri="{28A0092B-C50C-407E-A947-70E740481C1C}">
+                <a14:useLocalDpi xmlns:a14="http://schemas.microsoft.com/office/drawing/2010/main" val="0"/>
+              </a:ext>
+            </a:extLst>
+          </a:blip>
+          <a:stretch>
+            <a:fillRect/>
+          </a:stretch>
+        </p:blipFill>
+        <p:spPr>
+          <a:xfrm>
+            <a:off x="611560" y="404664"/>
+            <a:ext cx="6717060" cy="5616624"/>
+          </a:xfrm>
+          <a:prstGeom prst="rect">
+            <a:avLst/>
+          </a:prstGeom>
+        </p:spPr>
+      </p:pic>
       <p:sp>
         <p:nvSpPr>
           <p:cNvPr id="10" name="Inhaltsplatzhalter 9"/>
@@ -8062,7 +8210,7 @@
           <a:p>
             <a:r>
               <a:rPr lang="de-DE" smtClean="0"/>
-              <a:t>28.11.2016</a:t>
+              <a:t>01.09.2017</a:t>
             </a:r>
             <a:endParaRPr lang="de-DE"/>
           </a:p>
@@ -8150,9 +8298,328 @@
   <p:timing>
     <p:tnLst>
       <p:par>
-        <p:cTn id="1" dur="indefinite" restart="never" nodeType="tmRoot"/>
+        <p:cTn id="1" dur="indefinite" restart="never" nodeType="tmRoot">
+          <p:childTnLst>
+            <p:seq concurrent="1" nextAc="seek">
+              <p:cTn id="2" dur="indefinite" nodeType="mainSeq">
+                <p:childTnLst>
+                  <p:par>
+                    <p:cTn id="3" fill="hold">
+                      <p:stCondLst>
+                        <p:cond delay="indefinite"/>
+                      </p:stCondLst>
+                      <p:childTnLst>
+                        <p:par>
+                          <p:cTn id="4" fill="hold">
+                            <p:stCondLst>
+                              <p:cond delay="0"/>
+                            </p:stCondLst>
+                            <p:childTnLst>
+                              <p:par>
+                                <p:cTn id="5" presetID="1" presetClass="entr" presetSubtype="0" fill="hold" nodeType="clickEffect">
+                                  <p:stCondLst>
+                                    <p:cond delay="0"/>
+                                  </p:stCondLst>
+                                  <p:childTnLst>
+                                    <p:set>
+                                      <p:cBhvr>
+                                        <p:cTn id="6" dur="1" fill="hold">
+                                          <p:stCondLst>
+                                            <p:cond delay="0"/>
+                                          </p:stCondLst>
+                                        </p:cTn>
+                                        <p:tgtEl>
+                                          <p:spTgt spid="5"/>
+                                        </p:tgtEl>
+                                        <p:attrNameLst>
+                                          <p:attrName>style.visibility</p:attrName>
+                                        </p:attrNameLst>
+                                      </p:cBhvr>
+                                      <p:to>
+                                        <p:strVal val="visible"/>
+                                      </p:to>
+                                    </p:set>
+                                  </p:childTnLst>
+                                </p:cTn>
+                              </p:par>
+                              <p:par>
+                                <p:cTn id="7" presetID="1" presetClass="exit" presetSubtype="0" fill="hold" grpId="0" nodeType="withEffect">
+                                  <p:stCondLst>
+                                    <p:cond delay="0"/>
+                                  </p:stCondLst>
+                                  <p:childTnLst>
+                                    <p:set>
+                                      <p:cBhvr>
+                                        <p:cTn id="8" dur="1" fill="hold">
+                                          <p:stCondLst>
+                                            <p:cond delay="0"/>
+                                          </p:stCondLst>
+                                        </p:cTn>
+                                        <p:tgtEl>
+                                          <p:spTgt spid="10">
+                                            <p:txEl>
+                                              <p:pRg st="0" end="0"/>
+                                            </p:txEl>
+                                          </p:spTgt>
+                                        </p:tgtEl>
+                                        <p:attrNameLst>
+                                          <p:attrName>style.visibility</p:attrName>
+                                        </p:attrNameLst>
+                                      </p:cBhvr>
+                                      <p:to>
+                                        <p:strVal val="hidden"/>
+                                      </p:to>
+                                    </p:set>
+                                  </p:childTnLst>
+                                </p:cTn>
+                              </p:par>
+                              <p:par>
+                                <p:cTn id="9" presetID="1" presetClass="exit" presetSubtype="0" fill="hold" grpId="0" nodeType="withEffect">
+                                  <p:stCondLst>
+                                    <p:cond delay="0"/>
+                                  </p:stCondLst>
+                                  <p:childTnLst>
+                                    <p:set>
+                                      <p:cBhvr>
+                                        <p:cTn id="10" dur="1" fill="hold">
+                                          <p:stCondLst>
+                                            <p:cond delay="0"/>
+                                          </p:stCondLst>
+                                        </p:cTn>
+                                        <p:tgtEl>
+                                          <p:spTgt spid="10">
+                                            <p:txEl>
+                                              <p:pRg st="1" end="1"/>
+                                            </p:txEl>
+                                          </p:spTgt>
+                                        </p:tgtEl>
+                                        <p:attrNameLst>
+                                          <p:attrName>style.visibility</p:attrName>
+                                        </p:attrNameLst>
+                                      </p:cBhvr>
+                                      <p:to>
+                                        <p:strVal val="hidden"/>
+                                      </p:to>
+                                    </p:set>
+                                  </p:childTnLst>
+                                </p:cTn>
+                              </p:par>
+                              <p:par>
+                                <p:cTn id="11" presetID="1" presetClass="exit" presetSubtype="0" fill="hold" grpId="0" nodeType="withEffect">
+                                  <p:stCondLst>
+                                    <p:cond delay="0"/>
+                                  </p:stCondLst>
+                                  <p:childTnLst>
+                                    <p:set>
+                                      <p:cBhvr>
+                                        <p:cTn id="12" dur="1" fill="hold">
+                                          <p:stCondLst>
+                                            <p:cond delay="0"/>
+                                          </p:stCondLst>
+                                        </p:cTn>
+                                        <p:tgtEl>
+                                          <p:spTgt spid="10">
+                                            <p:txEl>
+                                              <p:pRg st="2" end="2"/>
+                                            </p:txEl>
+                                          </p:spTgt>
+                                        </p:tgtEl>
+                                        <p:attrNameLst>
+                                          <p:attrName>style.visibility</p:attrName>
+                                        </p:attrNameLst>
+                                      </p:cBhvr>
+                                      <p:to>
+                                        <p:strVal val="hidden"/>
+                                      </p:to>
+                                    </p:set>
+                                  </p:childTnLst>
+                                </p:cTn>
+                              </p:par>
+                              <p:par>
+                                <p:cTn id="13" presetID="1" presetClass="exit" presetSubtype="0" fill="hold" grpId="0" nodeType="withEffect">
+                                  <p:stCondLst>
+                                    <p:cond delay="0"/>
+                                  </p:stCondLst>
+                                  <p:childTnLst>
+                                    <p:set>
+                                      <p:cBhvr>
+                                        <p:cTn id="14" dur="1" fill="hold">
+                                          <p:stCondLst>
+                                            <p:cond delay="0"/>
+                                          </p:stCondLst>
+                                        </p:cTn>
+                                        <p:tgtEl>
+                                          <p:spTgt spid="10">
+                                            <p:txEl>
+                                              <p:pRg st="3" end="3"/>
+                                            </p:txEl>
+                                          </p:spTgt>
+                                        </p:tgtEl>
+                                        <p:attrNameLst>
+                                          <p:attrName>style.visibility</p:attrName>
+                                        </p:attrNameLst>
+                                      </p:cBhvr>
+                                      <p:to>
+                                        <p:strVal val="hidden"/>
+                                      </p:to>
+                                    </p:set>
+                                  </p:childTnLst>
+                                </p:cTn>
+                              </p:par>
+                              <p:par>
+                                <p:cTn id="15" presetID="1" presetClass="exit" presetSubtype="0" fill="hold" grpId="0" nodeType="withEffect">
+                                  <p:stCondLst>
+                                    <p:cond delay="0"/>
+                                  </p:stCondLst>
+                                  <p:childTnLst>
+                                    <p:set>
+                                      <p:cBhvr>
+                                        <p:cTn id="16" dur="1" fill="hold">
+                                          <p:stCondLst>
+                                            <p:cond delay="0"/>
+                                          </p:stCondLst>
+                                        </p:cTn>
+                                        <p:tgtEl>
+                                          <p:spTgt spid="10">
+                                            <p:txEl>
+                                              <p:pRg st="4" end="4"/>
+                                            </p:txEl>
+                                          </p:spTgt>
+                                        </p:tgtEl>
+                                        <p:attrNameLst>
+                                          <p:attrName>style.visibility</p:attrName>
+                                        </p:attrNameLst>
+                                      </p:cBhvr>
+                                      <p:to>
+                                        <p:strVal val="hidden"/>
+                                      </p:to>
+                                    </p:set>
+                                  </p:childTnLst>
+                                </p:cTn>
+                              </p:par>
+                              <p:par>
+                                <p:cTn id="17" presetID="1" presetClass="exit" presetSubtype="0" fill="hold" grpId="0" nodeType="withEffect">
+                                  <p:stCondLst>
+                                    <p:cond delay="0"/>
+                                  </p:stCondLst>
+                                  <p:childTnLst>
+                                    <p:set>
+                                      <p:cBhvr>
+                                        <p:cTn id="18" dur="1" fill="hold">
+                                          <p:stCondLst>
+                                            <p:cond delay="0"/>
+                                          </p:stCondLst>
+                                        </p:cTn>
+                                        <p:tgtEl>
+                                          <p:spTgt spid="10">
+                                            <p:txEl>
+                                              <p:pRg st="5" end="5"/>
+                                            </p:txEl>
+                                          </p:spTgt>
+                                        </p:tgtEl>
+                                        <p:attrNameLst>
+                                          <p:attrName>style.visibility</p:attrName>
+                                        </p:attrNameLst>
+                                      </p:cBhvr>
+                                      <p:to>
+                                        <p:strVal val="hidden"/>
+                                      </p:to>
+                                    </p:set>
+                                  </p:childTnLst>
+                                </p:cTn>
+                              </p:par>
+                              <p:par>
+                                <p:cTn id="19" presetID="1" presetClass="exit" presetSubtype="0" fill="hold" grpId="0" nodeType="withEffect">
+                                  <p:stCondLst>
+                                    <p:cond delay="0"/>
+                                  </p:stCondLst>
+                                  <p:childTnLst>
+                                    <p:set>
+                                      <p:cBhvr>
+                                        <p:cTn id="20" dur="1" fill="hold">
+                                          <p:stCondLst>
+                                            <p:cond delay="0"/>
+                                          </p:stCondLst>
+                                        </p:cTn>
+                                        <p:tgtEl>
+                                          <p:spTgt spid="10">
+                                            <p:txEl>
+                                              <p:pRg st="6" end="6"/>
+                                            </p:txEl>
+                                          </p:spTgt>
+                                        </p:tgtEl>
+                                        <p:attrNameLst>
+                                          <p:attrName>style.visibility</p:attrName>
+                                        </p:attrNameLst>
+                                      </p:cBhvr>
+                                      <p:to>
+                                        <p:strVal val="hidden"/>
+                                      </p:to>
+                                    </p:set>
+                                  </p:childTnLst>
+                                </p:cTn>
+                              </p:par>
+                              <p:par>
+                                <p:cTn id="21" presetID="1" presetClass="exit" presetSubtype="0" fill="hold" grpId="0" nodeType="withEffect">
+                                  <p:stCondLst>
+                                    <p:cond delay="0"/>
+                                  </p:stCondLst>
+                                  <p:childTnLst>
+                                    <p:set>
+                                      <p:cBhvr>
+                                        <p:cTn id="22" dur="1" fill="hold">
+                                          <p:stCondLst>
+                                            <p:cond delay="0"/>
+                                          </p:stCondLst>
+                                        </p:cTn>
+                                        <p:tgtEl>
+                                          <p:spTgt spid="10">
+                                            <p:txEl>
+                                              <p:pRg st="7" end="7"/>
+                                            </p:txEl>
+                                          </p:spTgt>
+                                        </p:tgtEl>
+                                        <p:attrNameLst>
+                                          <p:attrName>style.visibility</p:attrName>
+                                        </p:attrNameLst>
+                                      </p:cBhvr>
+                                      <p:to>
+                                        <p:strVal val="hidden"/>
+                                      </p:to>
+                                    </p:set>
+                                  </p:childTnLst>
+                                </p:cTn>
+                              </p:par>
+                            </p:childTnLst>
+                          </p:cTn>
+                        </p:par>
+                      </p:childTnLst>
+                    </p:cTn>
+                  </p:par>
+                </p:childTnLst>
+              </p:cTn>
+              <p:prevCondLst>
+                <p:cond evt="onPrev" delay="0">
+                  <p:tgtEl>
+                    <p:sldTgt/>
+                  </p:tgtEl>
+                </p:cond>
+              </p:prevCondLst>
+              <p:nextCondLst>
+                <p:cond evt="onNext" delay="0">
+                  <p:tgtEl>
+                    <p:sldTgt/>
+                  </p:tgtEl>
+                </p:cond>
+              </p:nextCondLst>
+            </p:seq>
+          </p:childTnLst>
+        </p:cTn>
       </p:par>
     </p:tnLst>
+    <p:bldLst>
+      <p:bldP spid="10" grpId="0" build="p"/>
+    </p:bldLst>
   </p:timing>
 </p:sld>
 </file>
@@ -8191,7 +8658,7 @@
           <a:p>
             <a:r>
               <a:rPr lang="de-DE" smtClean="0"/>
-              <a:t>28.11.2016</a:t>
+              <a:t>01.09.2017</a:t>
             </a:r>
             <a:endParaRPr lang="de-DE"/>
           </a:p>
@@ -8478,7 +8945,7 @@
           <a:p>
             <a:r>
               <a:rPr lang="de-DE" smtClean="0"/>
-              <a:t>28.11.2016</a:t>
+              <a:t>01.09.2017</a:t>
             </a:r>
             <a:endParaRPr lang="de-DE"/>
           </a:p>

</xml_diff>

<commit_message>
Finaler Stand der Bachelor-Verteidigung
</commit_message>
<xml_diff>
--- a/Bachelor/Präsentation Bachelor.pptx
+++ b/Bachelor/Präsentation Bachelor.pptx
@@ -5,7 +5,7 @@
     <p:sldMasterId id="2147483672" r:id="rId1"/>
   </p:sldMasterIdLst>
   <p:notesMasterIdLst>
-    <p:notesMasterId r:id="rId13"/>
+    <p:notesMasterId r:id="rId15"/>
   </p:notesMasterIdLst>
   <p:sldIdLst>
     <p:sldId id="256" r:id="rId2"/>
@@ -14,11 +14,13 @@
     <p:sldId id="260" r:id="rId5"/>
     <p:sldId id="277" r:id="rId6"/>
     <p:sldId id="278" r:id="rId7"/>
-    <p:sldId id="265" r:id="rId8"/>
-    <p:sldId id="279" r:id="rId9"/>
-    <p:sldId id="280" r:id="rId10"/>
-    <p:sldId id="273" r:id="rId11"/>
-    <p:sldId id="276" r:id="rId12"/>
+    <p:sldId id="281" r:id="rId8"/>
+    <p:sldId id="265" r:id="rId9"/>
+    <p:sldId id="279" r:id="rId10"/>
+    <p:sldId id="282" r:id="rId11"/>
+    <p:sldId id="280" r:id="rId12"/>
+    <p:sldId id="273" r:id="rId13"/>
+    <p:sldId id="276" r:id="rId14"/>
   </p:sldIdLst>
   <p:sldSz cx="9144000" cy="6858000" type="screen4x3"/>
   <p:notesSz cx="6858000" cy="9144000"/>
@@ -202,7 +204,7 @@
           <a:p>
             <a:fld id="{D13AFE29-CA10-4DFC-BB72-78DA4D25FD73}" type="datetimeFigureOut">
               <a:rPr lang="de-DE" smtClean="0"/>
-              <a:t>29.08.2017</a:t>
+              <a:t>01.09.2017</a:t>
             </a:fld>
             <a:endParaRPr lang="de-DE"/>
           </a:p>
@@ -871,7 +873,7 @@
           <a:p>
             <a:fld id="{F0E9705E-4DED-4616-BF4C-6DB708317084}" type="slidenum">
               <a:rPr lang="de-DE" smtClean="0"/>
-              <a:t>7</a:t>
+              <a:t>8</a:t>
             </a:fld>
             <a:endParaRPr lang="de-DE"/>
           </a:p>
@@ -5671,43 +5673,35 @@
       </p:grpSpPr>
       <p:sp>
         <p:nvSpPr>
-          <p:cNvPr id="2" name="Titel 1"/>
-          <p:cNvSpPr>
-            <a:spLocks noGrp="1"/>
-          </p:cNvSpPr>
-          <p:nvPr>
-            <p:ph type="ctrTitle"/>
-          </p:nvPr>
-        </p:nvSpPr>
-        <p:spPr>
-          <a:xfrm>
-            <a:off x="611560" y="2564904"/>
-            <a:ext cx="7406640" cy="1472184"/>
-          </a:xfrm>
-        </p:spPr>
-        <p:txBody>
-          <a:bodyPr>
-            <a:noAutofit/>
-          </a:bodyPr>
+          <p:cNvPr id="4" name="Datumsplatzhalter 3"/>
+          <p:cNvSpPr>
+            <a:spLocks noGrp="1"/>
+          </p:cNvSpPr>
+          <p:nvPr>
+            <p:ph type="dt" sz="half" idx="10"/>
+          </p:nvPr>
+        </p:nvSpPr>
+        <p:spPr/>
+        <p:txBody>
+          <a:bodyPr/>
           <a:lstStyle/>
           <a:p>
-            <a:pPr algn="ctr"/>
-            <a:r>
-              <a:rPr lang="de-DE" sz="5400" dirty="0" smtClean="0"/>
-              <a:t>Vielen Dank für ihre Aufmerksamkeit</a:t>
-            </a:r>
-            <a:endParaRPr lang="de-DE" sz="5400" dirty="0"/>
-          </a:p>
-        </p:txBody>
-      </p:sp>
-      <p:sp>
-        <p:nvSpPr>
-          <p:cNvPr id="3" name="Datumsplatzhalter 2"/>
-          <p:cNvSpPr>
-            <a:spLocks noGrp="1"/>
-          </p:cNvSpPr>
-          <p:nvPr>
-            <p:ph type="dt" sz="half" idx="10"/>
+            <a:r>
+              <a:rPr lang="de-DE" smtClean="0"/>
+              <a:t>01.09.2017</a:t>
+            </a:r>
+            <a:endParaRPr lang="de-DE"/>
+          </a:p>
+        </p:txBody>
+      </p:sp>
+      <p:sp>
+        <p:nvSpPr>
+          <p:cNvPr id="5" name="Fußzeilenplatzhalter 4"/>
+          <p:cNvSpPr>
+            <a:spLocks noGrp="1"/>
+          </p:cNvSpPr>
+          <p:nvPr>
+            <p:ph type="ftr" sz="quarter" idx="11"/>
           </p:nvPr>
         </p:nvSpPr>
         <p:spPr/>
@@ -5717,7 +5711,7 @@
           <a:p>
             <a:r>
               <a:rPr lang="de-DE" smtClean="0"/>
-              <a:t>01.09.2017</a:t>
+              <a:t>Martin Schneider, 6000513</a:t>
             </a:r>
             <a:endParaRPr lang="de-DE" dirty="0"/>
           </a:p>
@@ -5725,35 +5719,7 @@
       </p:sp>
       <p:sp>
         <p:nvSpPr>
-          <p:cNvPr id="4" name="Fußzeilenplatzhalter 3"/>
-          <p:cNvSpPr>
-            <a:spLocks noGrp="1"/>
-          </p:cNvSpPr>
-          <p:nvPr>
-            <p:ph type="ftr" sz="quarter" idx="11"/>
-          </p:nvPr>
-        </p:nvSpPr>
-        <p:spPr>
-          <a:xfrm>
-            <a:off x="5796136" y="44624"/>
-            <a:ext cx="2808312" cy="332234"/>
-          </a:xfrm>
-        </p:spPr>
-        <p:txBody>
-          <a:bodyPr/>
-          <a:lstStyle/>
-          <a:p>
-            <a:r>
-              <a:rPr lang="de-DE" smtClean="0"/>
-              <a:t>Martin Schneider, 6000513</a:t>
-            </a:r>
-            <a:endParaRPr lang="de-DE"/>
-          </a:p>
-        </p:txBody>
-      </p:sp>
-      <p:sp>
-        <p:nvSpPr>
-          <p:cNvPr id="5" name="Foliennummernplatzhalter 4"/>
+          <p:cNvPr id="6" name="Foliennummernplatzhalter 5"/>
           <p:cNvSpPr>
             <a:spLocks noGrp="1"/>
           </p:cNvSpPr>
@@ -5774,10 +5740,125 @@
           </a:p>
         </p:txBody>
       </p:sp>
+      <p:sp>
+        <p:nvSpPr>
+          <p:cNvPr id="8" name="Titel 1"/>
+          <p:cNvSpPr txBox="1">
+            <a:spLocks/>
+          </p:cNvSpPr>
+          <p:nvPr/>
+        </p:nvSpPr>
+        <p:spPr>
+          <a:xfrm>
+            <a:off x="609600" y="427038"/>
+            <a:ext cx="8229600" cy="1143000"/>
+          </a:xfrm>
+          <a:prstGeom prst="rect">
+            <a:avLst/>
+          </a:prstGeom>
+        </p:spPr>
+        <p:txBody>
+          <a:bodyPr vert="horz" rtlCol="0" anchor="ctr">
+            <a:normAutofit/>
+            <a:scene3d>
+              <a:camera prst="orthographicFront"/>
+              <a:lightRig rig="soft" dir="t"/>
+            </a:scene3d>
+            <a:sp3d prstMaterial="softEdge">
+              <a:bevelT w="25400" h="25400"/>
+            </a:sp3d>
+          </a:bodyPr>
+          <a:lstStyle>
+            <a:lvl1pPr algn="l" rtl="0" eaLnBrk="1" latinLnBrk="0" hangingPunct="1">
+              <a:spcBef>
+                <a:spcPct val="0"/>
+              </a:spcBef>
+              <a:buNone/>
+              <a:defRPr kumimoji="0" sz="4100" b="1" kern="1200">
+                <a:solidFill>
+                  <a:schemeClr val="tx2"/>
+                </a:solidFill>
+                <a:effectLst>
+                  <a:outerShdw blurRad="31750" dist="25400" dir="5400000" algn="tl" rotWithShape="0">
+                    <a:srgbClr val="000000">
+                      <a:alpha val="25000"/>
+                    </a:srgbClr>
+                  </a:outerShdw>
+                </a:effectLst>
+                <a:latin typeface="+mj-lt"/>
+                <a:ea typeface="+mj-ea"/>
+                <a:cs typeface="+mj-cs"/>
+              </a:defRPr>
+            </a:lvl1pPr>
+            <a:extLst/>
+          </a:lstStyle>
+          <a:p>
+            <a:r>
+              <a:rPr lang="de-DE" dirty="0" smtClean="0"/>
+              <a:t>3 Implementierung</a:t>
+            </a:r>
+            <a:endParaRPr lang="de-DE" dirty="0"/>
+          </a:p>
+        </p:txBody>
+      </p:sp>
+      <p:pic>
+        <p:nvPicPr>
+          <p:cNvPr id="2050" name="Picture 2"/>
+          <p:cNvPicPr>
+            <a:picLocks noChangeAspect="1" noChangeArrowheads="1"/>
+          </p:cNvPicPr>
+          <p:nvPr/>
+        </p:nvPicPr>
+        <p:blipFill>
+          <a:blip r:embed="rId2" cstate="print">
+            <a:extLst>
+              <a:ext uri="{28A0092B-C50C-407E-A947-70E740481C1C}">
+                <a14:useLocalDpi xmlns:a14="http://schemas.microsoft.com/office/drawing/2010/main" val="0"/>
+              </a:ext>
+            </a:extLst>
+          </a:blip>
+          <a:srcRect/>
+          <a:stretch>
+            <a:fillRect/>
+          </a:stretch>
+        </p:blipFill>
+        <p:spPr bwMode="auto">
+          <a:xfrm>
+            <a:off x="803602" y="1412776"/>
+            <a:ext cx="7841596" cy="4410898"/>
+          </a:xfrm>
+          <a:prstGeom prst="rect">
+            <a:avLst/>
+          </a:prstGeom>
+          <a:noFill/>
+          <a:ln>
+            <a:noFill/>
+          </a:ln>
+          <a:extLst>
+            <a:ext uri="{909E8E84-426E-40DD-AFC4-6F175D3DCCD1}">
+              <a14:hiddenFill xmlns:a14="http://schemas.microsoft.com/office/drawing/2010/main">
+                <a:solidFill>
+                  <a:schemeClr val="accent1"/>
+                </a:solidFill>
+              </a14:hiddenFill>
+            </a:ext>
+            <a:ext uri="{91240B29-F687-4F45-9708-019B960494DF}">
+              <a14:hiddenLine xmlns:a14="http://schemas.microsoft.com/office/drawing/2010/main" w="9525">
+                <a:solidFill>
+                  <a:schemeClr val="tx1"/>
+                </a:solidFill>
+                <a:miter lim="800000"/>
+                <a:headEnd/>
+                <a:tailEnd/>
+              </a14:hiddenLine>
+            </a:ext>
+          </a:extLst>
+        </p:spPr>
+      </p:pic>
     </p:spTree>
     <p:extLst>
       <p:ext uri="{BB962C8B-B14F-4D97-AF65-F5344CB8AC3E}">
-        <p14:creationId xmlns:p14="http://schemas.microsoft.com/office/powerpoint/2010/main" val="1555517133"/>
+        <p14:creationId xmlns:p14="http://schemas.microsoft.com/office/powerpoint/2010/main" val="3349506218"/>
       </p:ext>
     </p:extLst>
   </p:cSld>
@@ -5823,6 +5904,343 @@
         </p:nvSpPr>
         <p:spPr/>
         <p:txBody>
+          <a:bodyPr/>
+          <a:lstStyle/>
+          <a:p>
+            <a:r>
+              <a:rPr lang="de-DE" dirty="0" smtClean="0"/>
+              <a:t>Anbindung an firmeninterne Datenbanken</a:t>
+            </a:r>
+          </a:p>
+          <a:p>
+            <a:r>
+              <a:rPr lang="de-DE" dirty="0" smtClean="0"/>
+              <a:t>Vorratsprüfung für Rezepte</a:t>
+            </a:r>
+          </a:p>
+          <a:p>
+            <a:r>
+              <a:rPr lang="de-DE" dirty="0" smtClean="0"/>
+              <a:t>Stoffspezifische Bestandsgrenzen</a:t>
+            </a:r>
+          </a:p>
+          <a:p>
+            <a:r>
+              <a:rPr lang="de-DE" dirty="0" smtClean="0"/>
+              <a:t>Ausgabe und Analyse von Verbrauchsstatistiken</a:t>
+            </a:r>
+          </a:p>
+          <a:p>
+            <a:r>
+              <a:rPr lang="de-DE" dirty="0" smtClean="0"/>
+              <a:t>Unterstützung verschiedener </a:t>
+            </a:r>
+            <a:r>
+              <a:rPr lang="de-DE" dirty="0" err="1" smtClean="0"/>
+              <a:t>Waagenmodelle</a:t>
+            </a:r>
+            <a:endParaRPr lang="de-DE" dirty="0" smtClean="0"/>
+          </a:p>
+          <a:p>
+            <a:r>
+              <a:rPr lang="de-DE" dirty="0" smtClean="0"/>
+              <a:t>Drahtlose Übertragung der Einwaagen</a:t>
+            </a:r>
+          </a:p>
+          <a:p>
+            <a:r>
+              <a:rPr lang="de-DE" dirty="0" smtClean="0"/>
+              <a:t>Automatische Erkennung eingewogener Lieferungen</a:t>
+            </a:r>
+          </a:p>
+          <a:p>
+            <a:endParaRPr lang="de-DE" dirty="0"/>
+          </a:p>
+        </p:txBody>
+      </p:sp>
+      <p:sp>
+        <p:nvSpPr>
+          <p:cNvPr id="4" name="Datumsplatzhalter 3"/>
+          <p:cNvSpPr>
+            <a:spLocks noGrp="1"/>
+          </p:cNvSpPr>
+          <p:nvPr>
+            <p:ph type="dt" sz="half" idx="10"/>
+          </p:nvPr>
+        </p:nvSpPr>
+        <p:spPr/>
+        <p:txBody>
+          <a:bodyPr/>
+          <a:lstStyle/>
+          <a:p>
+            <a:r>
+              <a:rPr lang="de-DE" smtClean="0"/>
+              <a:t>01.09.2017</a:t>
+            </a:r>
+            <a:endParaRPr lang="de-DE"/>
+          </a:p>
+        </p:txBody>
+      </p:sp>
+      <p:sp>
+        <p:nvSpPr>
+          <p:cNvPr id="5" name="Fußzeilenplatzhalter 4"/>
+          <p:cNvSpPr>
+            <a:spLocks noGrp="1"/>
+          </p:cNvSpPr>
+          <p:nvPr>
+            <p:ph type="ftr" sz="quarter" idx="11"/>
+          </p:nvPr>
+        </p:nvSpPr>
+        <p:spPr/>
+        <p:txBody>
+          <a:bodyPr/>
+          <a:lstStyle/>
+          <a:p>
+            <a:r>
+              <a:rPr lang="de-DE" smtClean="0"/>
+              <a:t>Martin Schneider, 6000513</a:t>
+            </a:r>
+            <a:endParaRPr lang="de-DE" dirty="0"/>
+          </a:p>
+        </p:txBody>
+      </p:sp>
+      <p:sp>
+        <p:nvSpPr>
+          <p:cNvPr id="6" name="Foliennummernplatzhalter 5"/>
+          <p:cNvSpPr>
+            <a:spLocks noGrp="1"/>
+          </p:cNvSpPr>
+          <p:nvPr>
+            <p:ph type="sldNum" sz="quarter" idx="12"/>
+          </p:nvPr>
+        </p:nvSpPr>
+        <p:spPr/>
+        <p:txBody>
+          <a:bodyPr/>
+          <a:lstStyle/>
+          <a:p>
+            <a:fld id="{166D15F3-9A1A-4AEC-BA89-32D146ECA64D}" type="slidenum">
+              <a:rPr lang="de-DE" smtClean="0"/>
+              <a:t>11</a:t>
+            </a:fld>
+            <a:endParaRPr lang="de-DE"/>
+          </a:p>
+        </p:txBody>
+      </p:sp>
+      <p:sp>
+        <p:nvSpPr>
+          <p:cNvPr id="2" name="Titel 1"/>
+          <p:cNvSpPr>
+            <a:spLocks noGrp="1"/>
+          </p:cNvSpPr>
+          <p:nvPr>
+            <p:ph type="title"/>
+          </p:nvPr>
+        </p:nvSpPr>
+        <p:spPr/>
+        <p:txBody>
+          <a:bodyPr/>
+          <a:lstStyle/>
+          <a:p>
+            <a:r>
+              <a:rPr lang="de-DE" dirty="0" smtClean="0"/>
+              <a:t>4 Ausblick</a:t>
+            </a:r>
+            <a:endParaRPr lang="de-DE" dirty="0"/>
+          </a:p>
+        </p:txBody>
+      </p:sp>
+    </p:spTree>
+    <p:extLst>
+      <p:ext uri="{BB962C8B-B14F-4D97-AF65-F5344CB8AC3E}">
+        <p14:creationId xmlns:p14="http://schemas.microsoft.com/office/powerpoint/2010/main" val="2822618823"/>
+      </p:ext>
+    </p:extLst>
+  </p:cSld>
+  <p:clrMapOvr>
+    <a:masterClrMapping/>
+  </p:clrMapOvr>
+  <p:timing>
+    <p:tnLst>
+      <p:par>
+        <p:cTn id="1" dur="indefinite" restart="never" nodeType="tmRoot"/>
+      </p:par>
+    </p:tnLst>
+  </p:timing>
+</p:sld>
+</file>
+
+<file path=ppt/slides/slide12.xml><?xml version="1.0" encoding="utf-8"?>
+<p:sld xmlns:a="http://schemas.openxmlformats.org/drawingml/2006/main" xmlns:r="http://schemas.openxmlformats.org/officeDocument/2006/relationships" xmlns:p="http://schemas.openxmlformats.org/presentationml/2006/main">
+  <p:cSld>
+    <p:spTree>
+      <p:nvGrpSpPr>
+        <p:cNvPr id="1" name=""/>
+        <p:cNvGrpSpPr/>
+        <p:nvPr/>
+      </p:nvGrpSpPr>
+      <p:grpSpPr>
+        <a:xfrm>
+          <a:off x="0" y="0"/>
+          <a:ext cx="0" cy="0"/>
+          <a:chOff x="0" y="0"/>
+          <a:chExt cx="0" cy="0"/>
+        </a:xfrm>
+      </p:grpSpPr>
+      <p:sp>
+        <p:nvSpPr>
+          <p:cNvPr id="2" name="Titel 1"/>
+          <p:cNvSpPr>
+            <a:spLocks noGrp="1"/>
+          </p:cNvSpPr>
+          <p:nvPr>
+            <p:ph type="ctrTitle"/>
+          </p:nvPr>
+        </p:nvSpPr>
+        <p:spPr>
+          <a:xfrm>
+            <a:off x="611560" y="2564904"/>
+            <a:ext cx="7406640" cy="1472184"/>
+          </a:xfrm>
+        </p:spPr>
+        <p:txBody>
+          <a:bodyPr>
+            <a:noAutofit/>
+          </a:bodyPr>
+          <a:lstStyle/>
+          <a:p>
+            <a:pPr algn="ctr"/>
+            <a:r>
+              <a:rPr lang="de-DE" sz="5400" dirty="0" smtClean="0"/>
+              <a:t>Vielen Dank für ihre Aufmerksamkeit</a:t>
+            </a:r>
+            <a:endParaRPr lang="de-DE" sz="5400" dirty="0"/>
+          </a:p>
+        </p:txBody>
+      </p:sp>
+      <p:sp>
+        <p:nvSpPr>
+          <p:cNvPr id="3" name="Datumsplatzhalter 2"/>
+          <p:cNvSpPr>
+            <a:spLocks noGrp="1"/>
+          </p:cNvSpPr>
+          <p:nvPr>
+            <p:ph type="dt" sz="half" idx="10"/>
+          </p:nvPr>
+        </p:nvSpPr>
+        <p:spPr/>
+        <p:txBody>
+          <a:bodyPr/>
+          <a:lstStyle/>
+          <a:p>
+            <a:r>
+              <a:rPr lang="de-DE" smtClean="0"/>
+              <a:t>01.09.2017</a:t>
+            </a:r>
+            <a:endParaRPr lang="de-DE" dirty="0"/>
+          </a:p>
+        </p:txBody>
+      </p:sp>
+      <p:sp>
+        <p:nvSpPr>
+          <p:cNvPr id="4" name="Fußzeilenplatzhalter 3"/>
+          <p:cNvSpPr>
+            <a:spLocks noGrp="1"/>
+          </p:cNvSpPr>
+          <p:nvPr>
+            <p:ph type="ftr" sz="quarter" idx="11"/>
+          </p:nvPr>
+        </p:nvSpPr>
+        <p:spPr>
+          <a:xfrm>
+            <a:off x="5796136" y="44624"/>
+            <a:ext cx="2808312" cy="332234"/>
+          </a:xfrm>
+        </p:spPr>
+        <p:txBody>
+          <a:bodyPr/>
+          <a:lstStyle/>
+          <a:p>
+            <a:r>
+              <a:rPr lang="de-DE" smtClean="0"/>
+              <a:t>Martin Schneider, 6000513</a:t>
+            </a:r>
+            <a:endParaRPr lang="de-DE"/>
+          </a:p>
+        </p:txBody>
+      </p:sp>
+      <p:sp>
+        <p:nvSpPr>
+          <p:cNvPr id="5" name="Foliennummernplatzhalter 4"/>
+          <p:cNvSpPr>
+            <a:spLocks noGrp="1"/>
+          </p:cNvSpPr>
+          <p:nvPr>
+            <p:ph type="sldNum" sz="quarter" idx="12"/>
+          </p:nvPr>
+        </p:nvSpPr>
+        <p:spPr/>
+        <p:txBody>
+          <a:bodyPr/>
+          <a:lstStyle/>
+          <a:p>
+            <a:fld id="{166D15F3-9A1A-4AEC-BA89-32D146ECA64D}" type="slidenum">
+              <a:rPr lang="de-DE" smtClean="0"/>
+              <a:t>12</a:t>
+            </a:fld>
+            <a:endParaRPr lang="de-DE"/>
+          </a:p>
+        </p:txBody>
+      </p:sp>
+    </p:spTree>
+    <p:extLst>
+      <p:ext uri="{BB962C8B-B14F-4D97-AF65-F5344CB8AC3E}">
+        <p14:creationId xmlns:p14="http://schemas.microsoft.com/office/powerpoint/2010/main" val="1555517133"/>
+      </p:ext>
+    </p:extLst>
+  </p:cSld>
+  <p:clrMapOvr>
+    <a:masterClrMapping/>
+  </p:clrMapOvr>
+  <p:timing>
+    <p:tnLst>
+      <p:par>
+        <p:cTn id="1" dur="indefinite" restart="never" nodeType="tmRoot"/>
+      </p:par>
+    </p:tnLst>
+  </p:timing>
+</p:sld>
+</file>
+
+<file path=ppt/slides/slide13.xml><?xml version="1.0" encoding="utf-8"?>
+<p:sld xmlns:a="http://schemas.openxmlformats.org/drawingml/2006/main" xmlns:r="http://schemas.openxmlformats.org/officeDocument/2006/relationships" xmlns:p="http://schemas.openxmlformats.org/presentationml/2006/main">
+  <p:cSld>
+    <p:spTree>
+      <p:nvGrpSpPr>
+        <p:cNvPr id="1" name=""/>
+        <p:cNvGrpSpPr/>
+        <p:nvPr/>
+      </p:nvGrpSpPr>
+      <p:grpSpPr>
+        <a:xfrm>
+          <a:off x="0" y="0"/>
+          <a:ext cx="0" cy="0"/>
+          <a:chOff x="0" y="0"/>
+          <a:chExt cx="0" cy="0"/>
+        </a:xfrm>
+      </p:grpSpPr>
+      <p:sp>
+        <p:nvSpPr>
+          <p:cNvPr id="3" name="Inhaltsplatzhalter 2"/>
+          <p:cNvSpPr>
+            <a:spLocks noGrp="1"/>
+          </p:cNvSpPr>
+          <p:nvPr>
+            <p:ph idx="1"/>
+          </p:nvPr>
+        </p:nvSpPr>
+        <p:spPr/>
+        <p:txBody>
           <a:bodyPr>
             <a:normAutofit/>
           </a:bodyPr>
@@ -5998,7 +6416,7 @@
           <a:p>
             <a:fld id="{166D15F3-9A1A-4AEC-BA89-32D146ECA64D}" type="slidenum">
               <a:rPr lang="de-DE" smtClean="0"/>
-              <a:t>11</a:t>
+              <a:t>13</a:t>
             </a:fld>
             <a:endParaRPr lang="de-DE"/>
           </a:p>
@@ -6112,11 +6530,19 @@
             </a:r>
             <a:r>
               <a:rPr lang="de-DE" dirty="0"/>
-              <a:t>HTML, PHP, CSS und </a:t>
+              <a:t>HTML, PHP, </a:t>
             </a:r>
             <a:r>
               <a:rPr lang="de-DE" dirty="0" smtClean="0"/>
+              <a:t>CSS, </a:t>
+            </a:r>
+            <a:r>
+              <a:rPr lang="de-DE" dirty="0" err="1" smtClean="0"/>
               <a:t>Javascript</a:t>
+            </a:r>
+            <a:r>
+              <a:rPr lang="de-DE" dirty="0" smtClean="0"/>
+              <a:t> und C#</a:t>
             </a:r>
           </a:p>
           <a:p>
@@ -7532,7 +7958,7 @@
           <a:p>
             <a:r>
               <a:rPr lang="de-DE" dirty="0" smtClean="0"/>
-              <a:t>Hypertext </a:t>
+              <a:t>PHP: Hypertext </a:t>
             </a:r>
             <a:r>
               <a:rPr lang="de-DE" dirty="0" err="1" smtClean="0"/>
@@ -7543,7 +7969,7 @@
           <a:p>
             <a:r>
               <a:rPr lang="de-DE" dirty="0" smtClean="0"/>
-              <a:t>Datenverarbeitung</a:t>
+              <a:t>Serverseitige Datenverarbeitung</a:t>
             </a:r>
           </a:p>
           <a:p>
@@ -8094,11 +8520,507 @@
           <a:chExt cx="0" cy="0"/>
         </a:xfrm>
       </p:grpSpPr>
+      <p:sp>
+        <p:nvSpPr>
+          <p:cNvPr id="3" name="Inhaltsplatzhalter 2"/>
+          <p:cNvSpPr>
+            <a:spLocks noGrp="1"/>
+          </p:cNvSpPr>
+          <p:nvPr>
+            <p:ph idx="1"/>
+          </p:nvPr>
+        </p:nvSpPr>
+        <p:spPr/>
+        <p:txBody>
+          <a:bodyPr/>
+          <a:lstStyle/>
+          <a:p>
+            <a:r>
+              <a:rPr lang="de-DE" dirty="0" smtClean="0"/>
+              <a:t>C-Sharp</a:t>
+            </a:r>
+          </a:p>
+          <a:p>
+            <a:r>
+              <a:rPr lang="de-DE" dirty="0" smtClean="0"/>
+              <a:t>Objektorientierte Programmiersprache</a:t>
+            </a:r>
+          </a:p>
+          <a:p>
+            <a:r>
+              <a:rPr lang="de-DE" dirty="0" smtClean="0"/>
+              <a:t>Basiert auf .NET-Framework</a:t>
+            </a:r>
+          </a:p>
+          <a:p>
+            <a:r>
+              <a:rPr lang="de-DE" dirty="0" smtClean="0"/>
+              <a:t>Theoretisch plattformunabhängig</a:t>
+            </a:r>
+          </a:p>
+        </p:txBody>
+      </p:sp>
+      <p:sp>
+        <p:nvSpPr>
+          <p:cNvPr id="4" name="Datumsplatzhalter 3"/>
+          <p:cNvSpPr>
+            <a:spLocks noGrp="1"/>
+          </p:cNvSpPr>
+          <p:nvPr>
+            <p:ph type="dt" sz="half" idx="10"/>
+          </p:nvPr>
+        </p:nvSpPr>
+        <p:spPr/>
+        <p:txBody>
+          <a:bodyPr/>
+          <a:lstStyle/>
+          <a:p>
+            <a:r>
+              <a:rPr lang="de-DE" smtClean="0"/>
+              <a:t>01.09.2017</a:t>
+            </a:r>
+            <a:endParaRPr lang="de-DE"/>
+          </a:p>
+        </p:txBody>
+      </p:sp>
+      <p:sp>
+        <p:nvSpPr>
+          <p:cNvPr id="5" name="Fußzeilenplatzhalter 4"/>
+          <p:cNvSpPr>
+            <a:spLocks noGrp="1"/>
+          </p:cNvSpPr>
+          <p:nvPr>
+            <p:ph type="ftr" sz="quarter" idx="11"/>
+          </p:nvPr>
+        </p:nvSpPr>
+        <p:spPr/>
+        <p:txBody>
+          <a:bodyPr/>
+          <a:lstStyle/>
+          <a:p>
+            <a:r>
+              <a:rPr lang="de-DE" smtClean="0"/>
+              <a:t>Martin Schneider, 6000513</a:t>
+            </a:r>
+            <a:endParaRPr lang="de-DE" dirty="0"/>
+          </a:p>
+        </p:txBody>
+      </p:sp>
+      <p:sp>
+        <p:nvSpPr>
+          <p:cNvPr id="6" name="Foliennummernplatzhalter 5"/>
+          <p:cNvSpPr>
+            <a:spLocks noGrp="1"/>
+          </p:cNvSpPr>
+          <p:nvPr>
+            <p:ph type="sldNum" sz="quarter" idx="12"/>
+          </p:nvPr>
+        </p:nvSpPr>
+        <p:spPr/>
+        <p:txBody>
+          <a:bodyPr/>
+          <a:lstStyle/>
+          <a:p>
+            <a:fld id="{166D15F3-9A1A-4AEC-BA89-32D146ECA64D}" type="slidenum">
+              <a:rPr lang="de-DE" smtClean="0"/>
+              <a:t>7</a:t>
+            </a:fld>
+            <a:endParaRPr lang="de-DE"/>
+          </a:p>
+        </p:txBody>
+      </p:sp>
+      <p:sp>
+        <p:nvSpPr>
+          <p:cNvPr id="2" name="Titel 1"/>
+          <p:cNvSpPr>
+            <a:spLocks noGrp="1"/>
+          </p:cNvSpPr>
+          <p:nvPr>
+            <p:ph type="title"/>
+          </p:nvPr>
+        </p:nvSpPr>
+        <p:spPr/>
+        <p:txBody>
+          <a:bodyPr/>
+          <a:lstStyle/>
+          <a:p>
+            <a:r>
+              <a:rPr lang="de-DE" dirty="0" smtClean="0"/>
+              <a:t>1.2 C#</a:t>
+            </a:r>
+            <a:endParaRPr lang="de-DE" dirty="0"/>
+          </a:p>
+        </p:txBody>
+      </p:sp>
       <p:pic>
         <p:nvPicPr>
-          <p:cNvPr id="5" name="Grafik 4"/>
+          <p:cNvPr id="1026" name="Picture 2"/>
           <p:cNvPicPr>
-            <a:picLocks noChangeAspect="1"/>
+            <a:picLocks noChangeAspect="1" noChangeArrowheads="1"/>
+          </p:cNvPicPr>
+          <p:nvPr/>
+        </p:nvPicPr>
+        <p:blipFill rotWithShape="1">
+          <a:blip r:embed="rId2">
+            <a:extLst>
+              <a:ext uri="{28A0092B-C50C-407E-A947-70E740481C1C}">
+                <a14:useLocalDpi xmlns:a14="http://schemas.microsoft.com/office/drawing/2010/main" val="0"/>
+              </a:ext>
+            </a:extLst>
+          </a:blip>
+          <a:srcRect t="899"/>
+          <a:stretch/>
+        </p:blipFill>
+        <p:spPr bwMode="auto">
+          <a:xfrm>
+            <a:off x="683568" y="3356992"/>
+            <a:ext cx="3960440" cy="2239216"/>
+          </a:xfrm>
+          <a:prstGeom prst="rect">
+            <a:avLst/>
+          </a:prstGeom>
+          <a:noFill/>
+          <a:ln>
+            <a:noFill/>
+          </a:ln>
+          <a:extLst>
+            <a:ext uri="{909E8E84-426E-40DD-AFC4-6F175D3DCCD1}">
+              <a14:hiddenFill xmlns:a14="http://schemas.microsoft.com/office/drawing/2010/main">
+                <a:solidFill>
+                  <a:schemeClr val="accent1"/>
+                </a:solidFill>
+              </a14:hiddenFill>
+            </a:ext>
+            <a:ext uri="{91240B29-F687-4F45-9708-019B960494DF}">
+              <a14:hiddenLine xmlns:a14="http://schemas.microsoft.com/office/drawing/2010/main" w="9525">
+                <a:solidFill>
+                  <a:schemeClr val="tx1"/>
+                </a:solidFill>
+                <a:miter lim="800000"/>
+                <a:headEnd/>
+                <a:tailEnd/>
+              </a14:hiddenLine>
+            </a:ext>
+          </a:extLst>
+        </p:spPr>
+      </p:pic>
+      <p:sp>
+        <p:nvSpPr>
+          <p:cNvPr id="8" name="Textfeld 7"/>
+          <p:cNvSpPr txBox="1"/>
+          <p:nvPr/>
+        </p:nvSpPr>
+        <p:spPr>
+          <a:xfrm>
+            <a:off x="683568" y="5661248"/>
+            <a:ext cx="2291012" cy="276999"/>
+          </a:xfrm>
+          <a:prstGeom prst="rect">
+            <a:avLst/>
+          </a:prstGeom>
+          <a:noFill/>
+        </p:spPr>
+        <p:txBody>
+          <a:bodyPr wrap="none" rtlCol="0">
+            <a:spAutoFit/>
+          </a:bodyPr>
+          <a:lstStyle/>
+          <a:p>
+            <a:r>
+              <a:rPr lang="de-DE" sz="1200" b="1" dirty="0" smtClean="0"/>
+              <a:t>Konsolenanwendung mit C#</a:t>
+            </a:r>
+            <a:endParaRPr lang="de-DE" sz="1200" b="1" dirty="0"/>
+          </a:p>
+        </p:txBody>
+      </p:sp>
+      <p:sp>
+        <p:nvSpPr>
+          <p:cNvPr id="9" name="Textfeld 8"/>
+          <p:cNvSpPr txBox="1"/>
+          <p:nvPr/>
+        </p:nvSpPr>
+        <p:spPr>
+          <a:xfrm>
+            <a:off x="4788024" y="5610624"/>
+            <a:ext cx="2427268" cy="276999"/>
+          </a:xfrm>
+          <a:prstGeom prst="rect">
+            <a:avLst/>
+          </a:prstGeom>
+          <a:noFill/>
+        </p:spPr>
+        <p:txBody>
+          <a:bodyPr wrap="none" rtlCol="0">
+            <a:spAutoFit/>
+          </a:bodyPr>
+          <a:lstStyle/>
+          <a:p>
+            <a:r>
+              <a:rPr lang="de-DE" sz="1200" b="1" dirty="0" smtClean="0"/>
+              <a:t>Graphische Oberfläche mit C#</a:t>
+            </a:r>
+            <a:endParaRPr lang="de-DE" sz="1200" b="1" dirty="0"/>
+          </a:p>
+        </p:txBody>
+      </p:sp>
+      <p:pic>
+        <p:nvPicPr>
+          <p:cNvPr id="1027" name="Picture 3"/>
+          <p:cNvPicPr>
+            <a:picLocks noChangeAspect="1" noChangeArrowheads="1"/>
+          </p:cNvPicPr>
+          <p:nvPr/>
+        </p:nvPicPr>
+        <p:blipFill>
+          <a:blip r:embed="rId3" cstate="print">
+            <a:extLst>
+              <a:ext uri="{28A0092B-C50C-407E-A947-70E740481C1C}">
+                <a14:useLocalDpi xmlns:a14="http://schemas.microsoft.com/office/drawing/2010/main" val="0"/>
+              </a:ext>
+            </a:extLst>
+          </a:blip>
+          <a:srcRect/>
+          <a:stretch>
+            <a:fillRect/>
+          </a:stretch>
+        </p:blipFill>
+        <p:spPr bwMode="auto">
+          <a:xfrm>
+            <a:off x="4788024" y="3356991"/>
+            <a:ext cx="3888432" cy="2239217"/>
+          </a:xfrm>
+          <a:prstGeom prst="rect">
+            <a:avLst/>
+          </a:prstGeom>
+          <a:noFill/>
+          <a:ln>
+            <a:noFill/>
+          </a:ln>
+          <a:extLst>
+            <a:ext uri="{909E8E84-426E-40DD-AFC4-6F175D3DCCD1}">
+              <a14:hiddenFill xmlns:a14="http://schemas.microsoft.com/office/drawing/2010/main">
+                <a:solidFill>
+                  <a:schemeClr val="accent1"/>
+                </a:solidFill>
+              </a14:hiddenFill>
+            </a:ext>
+            <a:ext uri="{91240B29-F687-4F45-9708-019B960494DF}">
+              <a14:hiddenLine xmlns:a14="http://schemas.microsoft.com/office/drawing/2010/main" w="9525">
+                <a:solidFill>
+                  <a:schemeClr val="tx1"/>
+                </a:solidFill>
+                <a:miter lim="800000"/>
+                <a:headEnd/>
+                <a:tailEnd/>
+              </a14:hiddenLine>
+            </a:ext>
+          </a:extLst>
+        </p:spPr>
+      </p:pic>
+    </p:spTree>
+    <p:extLst>
+      <p:ext uri="{BB962C8B-B14F-4D97-AF65-F5344CB8AC3E}">
+        <p14:creationId xmlns:p14="http://schemas.microsoft.com/office/powerpoint/2010/main" val="1680483292"/>
+      </p:ext>
+    </p:extLst>
+  </p:cSld>
+  <p:clrMapOvr>
+    <a:masterClrMapping/>
+  </p:clrMapOvr>
+  <p:timing>
+    <p:tnLst>
+      <p:par>
+        <p:cTn id="1" dur="indefinite" restart="never" nodeType="tmRoot"/>
+      </p:par>
+    </p:tnLst>
+  </p:timing>
+</p:sld>
+</file>
+
+<file path=ppt/slides/slide8.xml><?xml version="1.0" encoding="utf-8"?>
+<p:sld xmlns:a="http://schemas.openxmlformats.org/drawingml/2006/main" xmlns:r="http://schemas.openxmlformats.org/officeDocument/2006/relationships" xmlns:p="http://schemas.openxmlformats.org/presentationml/2006/main">
+  <p:cSld>
+    <p:spTree>
+      <p:nvGrpSpPr>
+        <p:cNvPr id="1" name=""/>
+        <p:cNvGrpSpPr/>
+        <p:nvPr/>
+      </p:nvGrpSpPr>
+      <p:grpSpPr>
+        <a:xfrm>
+          <a:off x="0" y="0"/>
+          <a:ext cx="0" cy="0"/>
+          <a:chOff x="0" y="0"/>
+          <a:chExt cx="0" cy="0"/>
+        </a:xfrm>
+      </p:grpSpPr>
+      <p:sp>
+        <p:nvSpPr>
+          <p:cNvPr id="10" name="Inhaltsplatzhalter 9"/>
+          <p:cNvSpPr>
+            <a:spLocks noGrp="1"/>
+          </p:cNvSpPr>
+          <p:nvPr>
+            <p:ph idx="1"/>
+          </p:nvPr>
+        </p:nvSpPr>
+        <p:spPr/>
+        <p:txBody>
+          <a:bodyPr/>
+          <a:lstStyle/>
+          <a:p>
+            <a:r>
+              <a:rPr lang="de-DE" dirty="0" smtClean="0"/>
+              <a:t>Benutzerfreundliche Bedienung</a:t>
+            </a:r>
+          </a:p>
+          <a:p>
+            <a:r>
+              <a:rPr lang="de-DE" dirty="0" smtClean="0"/>
+              <a:t>Bereitstellung von Grundfunktionen:</a:t>
+            </a:r>
+          </a:p>
+          <a:p>
+            <a:pPr lvl="1"/>
+            <a:r>
+              <a:rPr lang="de-DE" dirty="0" smtClean="0"/>
+              <a:t>Einträge einfügen</a:t>
+            </a:r>
+          </a:p>
+          <a:p>
+            <a:pPr lvl="1"/>
+            <a:r>
+              <a:rPr lang="de-DE" dirty="0" smtClean="0"/>
+              <a:t>Einträge bearbeiten</a:t>
+            </a:r>
+          </a:p>
+          <a:p>
+            <a:pPr lvl="1"/>
+            <a:r>
+              <a:rPr lang="de-DE" dirty="0" smtClean="0"/>
+              <a:t>Einträge anzeigen und filtern</a:t>
+            </a:r>
+          </a:p>
+          <a:p>
+            <a:pPr lvl="1"/>
+            <a:r>
+              <a:rPr lang="de-DE" dirty="0" smtClean="0"/>
+              <a:t>Verbrauch erfassen und speichern</a:t>
+            </a:r>
+          </a:p>
+          <a:p>
+            <a:r>
+              <a:rPr lang="de-DE" dirty="0" smtClean="0"/>
+              <a:t>Im gesamten Netzwerk erreichbar</a:t>
+            </a:r>
+          </a:p>
+          <a:p>
+            <a:r>
+              <a:rPr lang="de-DE" dirty="0" smtClean="0"/>
+              <a:t>Nutzerverwaltung</a:t>
+            </a:r>
+            <a:endParaRPr lang="de-DE" dirty="0"/>
+          </a:p>
+        </p:txBody>
+      </p:sp>
+      <p:sp>
+        <p:nvSpPr>
+          <p:cNvPr id="9" name="Datumsplatzhalter 8"/>
+          <p:cNvSpPr>
+            <a:spLocks noGrp="1"/>
+          </p:cNvSpPr>
+          <p:nvPr>
+            <p:ph type="dt" sz="half" idx="10"/>
+          </p:nvPr>
+        </p:nvSpPr>
+        <p:spPr/>
+        <p:txBody>
+          <a:bodyPr/>
+          <a:lstStyle/>
+          <a:p>
+            <a:r>
+              <a:rPr lang="de-DE" smtClean="0"/>
+              <a:t>01.09.2017</a:t>
+            </a:r>
+            <a:endParaRPr lang="de-DE"/>
+          </a:p>
+        </p:txBody>
+      </p:sp>
+      <p:sp>
+        <p:nvSpPr>
+          <p:cNvPr id="3" name="Fußzeilenplatzhalter 2"/>
+          <p:cNvSpPr>
+            <a:spLocks noGrp="1"/>
+          </p:cNvSpPr>
+          <p:nvPr>
+            <p:ph type="ftr" sz="quarter" idx="11"/>
+          </p:nvPr>
+        </p:nvSpPr>
+        <p:spPr/>
+        <p:txBody>
+          <a:bodyPr/>
+          <a:lstStyle/>
+          <a:p>
+            <a:r>
+              <a:rPr lang="de-DE" smtClean="0"/>
+              <a:t>Martin Schneider, 6000513</a:t>
+            </a:r>
+            <a:endParaRPr lang="de-DE"/>
+          </a:p>
+        </p:txBody>
+      </p:sp>
+      <p:sp>
+        <p:nvSpPr>
+          <p:cNvPr id="8" name="Foliennummernplatzhalter 7"/>
+          <p:cNvSpPr>
+            <a:spLocks noGrp="1"/>
+          </p:cNvSpPr>
+          <p:nvPr>
+            <p:ph type="sldNum" sz="quarter" idx="12"/>
+          </p:nvPr>
+        </p:nvSpPr>
+        <p:spPr/>
+        <p:txBody>
+          <a:bodyPr/>
+          <a:lstStyle/>
+          <a:p>
+            <a:fld id="{166D15F3-9A1A-4AEC-BA89-32D146ECA64D}" type="slidenum">
+              <a:rPr lang="de-DE" smtClean="0"/>
+              <a:t>8</a:t>
+            </a:fld>
+            <a:endParaRPr lang="de-DE"/>
+          </a:p>
+        </p:txBody>
+      </p:sp>
+      <p:sp>
+        <p:nvSpPr>
+          <p:cNvPr id="2" name="Titel 1"/>
+          <p:cNvSpPr>
+            <a:spLocks noGrp="1"/>
+          </p:cNvSpPr>
+          <p:nvPr>
+            <p:ph type="title"/>
+          </p:nvPr>
+        </p:nvSpPr>
+        <p:spPr/>
+        <p:txBody>
+          <a:bodyPr/>
+          <a:lstStyle/>
+          <a:p>
+            <a:r>
+              <a:rPr lang="de-DE" dirty="0" smtClean="0"/>
+              <a:t>2 Anforderungen</a:t>
+            </a:r>
+            <a:endParaRPr lang="de-DE" dirty="0"/>
+          </a:p>
+        </p:txBody>
+      </p:sp>
+      <p:pic>
+        <p:nvPicPr>
+          <p:cNvPr id="1027" name="Picture 3" descr="C:\Users\martin.schneider\Desktop\C#\Stuff\Bachelor\Präsentation\schema_text_inverse.png"/>
+          <p:cNvPicPr>
+            <a:picLocks noChangeAspect="1" noChangeArrowheads="1"/>
           </p:cNvPicPr>
           <p:nvPr/>
         </p:nvPicPr>
@@ -8110,181 +9032,31 @@
               </a:ext>
             </a:extLst>
           </a:blip>
+          <a:srcRect/>
           <a:stretch>
             <a:fillRect/>
           </a:stretch>
         </p:blipFill>
-        <p:spPr>
+        <p:spPr bwMode="auto">
           <a:xfrm>
-            <a:off x="611560" y="404664"/>
-            <a:ext cx="6717060" cy="5616624"/>
+            <a:off x="467544" y="1052735"/>
+            <a:ext cx="5616624" cy="5241201"/>
           </a:xfrm>
           <a:prstGeom prst="rect">
             <a:avLst/>
           </a:prstGeom>
+          <a:noFill/>
+          <a:extLst>
+            <a:ext uri="{909E8E84-426E-40DD-AFC4-6F175D3DCCD1}">
+              <a14:hiddenFill xmlns:a14="http://schemas.microsoft.com/office/drawing/2010/main">
+                <a:solidFill>
+                  <a:srgbClr val="FFFFFF"/>
+                </a:solidFill>
+              </a14:hiddenFill>
+            </a:ext>
+          </a:extLst>
         </p:spPr>
       </p:pic>
-      <p:sp>
-        <p:nvSpPr>
-          <p:cNvPr id="10" name="Inhaltsplatzhalter 9"/>
-          <p:cNvSpPr>
-            <a:spLocks noGrp="1"/>
-          </p:cNvSpPr>
-          <p:nvPr>
-            <p:ph idx="1"/>
-          </p:nvPr>
-        </p:nvSpPr>
-        <p:spPr/>
-        <p:txBody>
-          <a:bodyPr/>
-          <a:lstStyle/>
-          <a:p>
-            <a:r>
-              <a:rPr lang="de-DE" dirty="0" smtClean="0"/>
-              <a:t>Benutzerfreundliche Bedienung</a:t>
-            </a:r>
-          </a:p>
-          <a:p>
-            <a:r>
-              <a:rPr lang="de-DE" dirty="0" smtClean="0"/>
-              <a:t>Bereitstellung von Grundfunktionen:</a:t>
-            </a:r>
-          </a:p>
-          <a:p>
-            <a:pPr lvl="1"/>
-            <a:r>
-              <a:rPr lang="de-DE" dirty="0" smtClean="0"/>
-              <a:t>Einträge einfügen</a:t>
-            </a:r>
-          </a:p>
-          <a:p>
-            <a:pPr lvl="1"/>
-            <a:r>
-              <a:rPr lang="de-DE" dirty="0" smtClean="0"/>
-              <a:t>Einträge bearbeiten</a:t>
-            </a:r>
-          </a:p>
-          <a:p>
-            <a:pPr lvl="1"/>
-            <a:r>
-              <a:rPr lang="de-DE" dirty="0" smtClean="0"/>
-              <a:t>Einträge anzeigen und filtern</a:t>
-            </a:r>
-          </a:p>
-          <a:p>
-            <a:pPr lvl="1"/>
-            <a:r>
-              <a:rPr lang="de-DE" dirty="0" smtClean="0"/>
-              <a:t>Verbrauch erfassen und speichern</a:t>
-            </a:r>
-          </a:p>
-          <a:p>
-            <a:r>
-              <a:rPr lang="de-DE" dirty="0" smtClean="0"/>
-              <a:t>Im gesamten Netzwerk erreichbar</a:t>
-            </a:r>
-          </a:p>
-          <a:p>
-            <a:r>
-              <a:rPr lang="de-DE" dirty="0" smtClean="0"/>
-              <a:t>Nutzerverwaltung</a:t>
-            </a:r>
-            <a:endParaRPr lang="de-DE" dirty="0"/>
-          </a:p>
-        </p:txBody>
-      </p:sp>
-      <p:sp>
-        <p:nvSpPr>
-          <p:cNvPr id="9" name="Datumsplatzhalter 8"/>
-          <p:cNvSpPr>
-            <a:spLocks noGrp="1"/>
-          </p:cNvSpPr>
-          <p:nvPr>
-            <p:ph type="dt" sz="half" idx="10"/>
-          </p:nvPr>
-        </p:nvSpPr>
-        <p:spPr/>
-        <p:txBody>
-          <a:bodyPr/>
-          <a:lstStyle/>
-          <a:p>
-            <a:r>
-              <a:rPr lang="de-DE" smtClean="0"/>
-              <a:t>01.09.2017</a:t>
-            </a:r>
-            <a:endParaRPr lang="de-DE"/>
-          </a:p>
-        </p:txBody>
-      </p:sp>
-      <p:sp>
-        <p:nvSpPr>
-          <p:cNvPr id="3" name="Fußzeilenplatzhalter 2"/>
-          <p:cNvSpPr>
-            <a:spLocks noGrp="1"/>
-          </p:cNvSpPr>
-          <p:nvPr>
-            <p:ph type="ftr" sz="quarter" idx="11"/>
-          </p:nvPr>
-        </p:nvSpPr>
-        <p:spPr/>
-        <p:txBody>
-          <a:bodyPr/>
-          <a:lstStyle/>
-          <a:p>
-            <a:r>
-              <a:rPr lang="de-DE" smtClean="0"/>
-              <a:t>Martin Schneider, 6000513</a:t>
-            </a:r>
-            <a:endParaRPr lang="de-DE"/>
-          </a:p>
-        </p:txBody>
-      </p:sp>
-      <p:sp>
-        <p:nvSpPr>
-          <p:cNvPr id="8" name="Foliennummernplatzhalter 7"/>
-          <p:cNvSpPr>
-            <a:spLocks noGrp="1"/>
-          </p:cNvSpPr>
-          <p:nvPr>
-            <p:ph type="sldNum" sz="quarter" idx="12"/>
-          </p:nvPr>
-        </p:nvSpPr>
-        <p:spPr/>
-        <p:txBody>
-          <a:bodyPr/>
-          <a:lstStyle/>
-          <a:p>
-            <a:fld id="{166D15F3-9A1A-4AEC-BA89-32D146ECA64D}" type="slidenum">
-              <a:rPr lang="de-DE" smtClean="0"/>
-              <a:t>7</a:t>
-            </a:fld>
-            <a:endParaRPr lang="de-DE"/>
-          </a:p>
-        </p:txBody>
-      </p:sp>
-      <p:sp>
-        <p:nvSpPr>
-          <p:cNvPr id="2" name="Titel 1"/>
-          <p:cNvSpPr>
-            <a:spLocks noGrp="1"/>
-          </p:cNvSpPr>
-          <p:nvPr>
-            <p:ph type="title"/>
-          </p:nvPr>
-        </p:nvSpPr>
-        <p:spPr/>
-        <p:txBody>
-          <a:bodyPr/>
-          <a:lstStyle/>
-          <a:p>
-            <a:r>
-              <a:rPr lang="de-DE" dirty="0" smtClean="0"/>
-              <a:t>2 Anforderungen</a:t>
-            </a:r>
-            <a:endParaRPr lang="de-DE" dirty="0"/>
-          </a:p>
-        </p:txBody>
-      </p:sp>
     </p:spTree>
     <p:extLst>
       <p:ext uri="{BB962C8B-B14F-4D97-AF65-F5344CB8AC3E}">
@@ -8316,7 +9088,7 @@
                             </p:stCondLst>
                             <p:childTnLst>
                               <p:par>
-                                <p:cTn id="5" presetID="1" presetClass="entr" presetSubtype="0" fill="hold" nodeType="clickEffect">
+                                <p:cTn id="5" presetID="1" presetClass="exit" presetSubtype="0" fill="hold" grpId="0" nodeType="clickEffect">
                                   <p:stCondLst>
                                     <p:cond delay="0"/>
                                   </p:stCondLst>
@@ -8329,14 +9101,18 @@
                                           </p:stCondLst>
                                         </p:cTn>
                                         <p:tgtEl>
-                                          <p:spTgt spid="5"/>
+                                          <p:spTgt spid="10">
+                                            <p:txEl>
+                                              <p:pRg st="0" end="0"/>
+                                            </p:txEl>
+                                          </p:spTgt>
                                         </p:tgtEl>
                                         <p:attrNameLst>
                                           <p:attrName>style.visibility</p:attrName>
                                         </p:attrNameLst>
                                       </p:cBhvr>
                                       <p:to>
-                                        <p:strVal val="visible"/>
+                                        <p:strVal val="hidden"/>
                                       </p:to>
                                     </p:set>
                                   </p:childTnLst>
@@ -8358,7 +9134,7 @@
                                         <p:tgtEl>
                                           <p:spTgt spid="10">
                                             <p:txEl>
-                                              <p:pRg st="0" end="0"/>
+                                              <p:pRg st="1" end="1"/>
                                             </p:txEl>
                                           </p:spTgt>
                                         </p:tgtEl>
@@ -8389,7 +9165,7 @@
                                         <p:tgtEl>
                                           <p:spTgt spid="10">
                                             <p:txEl>
-                                              <p:pRg st="1" end="1"/>
+                                              <p:pRg st="2" end="2"/>
                                             </p:txEl>
                                           </p:spTgt>
                                         </p:tgtEl>
@@ -8420,7 +9196,7 @@
                                         <p:tgtEl>
                                           <p:spTgt spid="10">
                                             <p:txEl>
-                                              <p:pRg st="2" end="2"/>
+                                              <p:pRg st="3" end="3"/>
                                             </p:txEl>
                                           </p:spTgt>
                                         </p:tgtEl>
@@ -8451,7 +9227,7 @@
                                         <p:tgtEl>
                                           <p:spTgt spid="10">
                                             <p:txEl>
-                                              <p:pRg st="3" end="3"/>
+                                              <p:pRg st="4" end="4"/>
                                             </p:txEl>
                                           </p:spTgt>
                                         </p:tgtEl>
@@ -8482,7 +9258,7 @@
                                         <p:tgtEl>
                                           <p:spTgt spid="10">
                                             <p:txEl>
-                                              <p:pRg st="4" end="4"/>
+                                              <p:pRg st="5" end="5"/>
                                             </p:txEl>
                                           </p:spTgt>
                                         </p:tgtEl>
@@ -8513,7 +9289,7 @@
                                         <p:tgtEl>
                                           <p:spTgt spid="10">
                                             <p:txEl>
-                                              <p:pRg st="5" end="5"/>
+                                              <p:pRg st="6" end="6"/>
                                             </p:txEl>
                                           </p:spTgt>
                                         </p:tgtEl>
@@ -8544,7 +9320,7 @@
                                         <p:tgtEl>
                                           <p:spTgt spid="10">
                                             <p:txEl>
-                                              <p:pRg st="6" end="6"/>
+                                              <p:pRg st="7" end="7"/>
                                             </p:txEl>
                                           </p:spTgt>
                                         </p:tgtEl>
@@ -8560,7 +9336,7 @@
                                 </p:cTn>
                               </p:par>
                               <p:par>
-                                <p:cTn id="21" presetID="1" presetClass="exit" presetSubtype="0" fill="hold" grpId="0" nodeType="withEffect">
+                                <p:cTn id="21" presetID="1" presetClass="entr" presetSubtype="0" fill="hold" nodeType="withEffect">
                                   <p:stCondLst>
                                     <p:cond delay="0"/>
                                   </p:stCondLst>
@@ -8573,18 +9349,14 @@
                                           </p:stCondLst>
                                         </p:cTn>
                                         <p:tgtEl>
-                                          <p:spTgt spid="10">
-                                            <p:txEl>
-                                              <p:pRg st="7" end="7"/>
-                                            </p:txEl>
-                                          </p:spTgt>
+                                          <p:spTgt spid="1027"/>
                                         </p:tgtEl>
                                         <p:attrNameLst>
                                           <p:attrName>style.visibility</p:attrName>
                                         </p:attrNameLst>
                                       </p:cBhvr>
                                       <p:to>
-                                        <p:strVal val="hidden"/>
+                                        <p:strVal val="visible"/>
                                       </p:to>
                                     </p:set>
                                   </p:childTnLst>
@@ -8618,13 +9390,13 @@
       </p:par>
     </p:tnLst>
     <p:bldLst>
-      <p:bldP spid="10" grpId="0" build="p"/>
+      <p:bldP spid="10" grpId="0" uiExpand="1" build="p"/>
     </p:bldLst>
   </p:timing>
 </p:sld>
 </file>
 
-<file path=ppt/slides/slide8.xml><?xml version="1.0" encoding="utf-8"?>
+<file path=ppt/slides/slide9.xml><?xml version="1.0" encoding="utf-8"?>
 <p:sld xmlns:a="http://schemas.openxmlformats.org/drawingml/2006/main" xmlns:r="http://schemas.openxmlformats.org/officeDocument/2006/relationships" xmlns:p="http://schemas.openxmlformats.org/presentationml/2006/main">
   <p:cSld>
     <p:spTree>
@@ -8704,7 +9476,7 @@
           <a:p>
             <a:fld id="{166D15F3-9A1A-4AEC-BA89-32D146ECA64D}" type="slidenum">
               <a:rPr lang="de-DE" smtClean="0"/>
-              <a:t>8</a:t>
+              <a:t>9</a:t>
             </a:fld>
             <a:endParaRPr lang="de-DE"/>
           </a:p>
@@ -8829,201 +9601,6 @@
     <p:extLst>
       <p:ext uri="{BB962C8B-B14F-4D97-AF65-F5344CB8AC3E}">
         <p14:creationId xmlns:p14="http://schemas.microsoft.com/office/powerpoint/2010/main" val="1907529792"/>
-      </p:ext>
-    </p:extLst>
-  </p:cSld>
-  <p:clrMapOvr>
-    <a:masterClrMapping/>
-  </p:clrMapOvr>
-  <p:timing>
-    <p:tnLst>
-      <p:par>
-        <p:cTn id="1" dur="indefinite" restart="never" nodeType="tmRoot"/>
-      </p:par>
-    </p:tnLst>
-  </p:timing>
-</p:sld>
-</file>
-
-<file path=ppt/slides/slide9.xml><?xml version="1.0" encoding="utf-8"?>
-<p:sld xmlns:a="http://schemas.openxmlformats.org/drawingml/2006/main" xmlns:r="http://schemas.openxmlformats.org/officeDocument/2006/relationships" xmlns:p="http://schemas.openxmlformats.org/presentationml/2006/main">
-  <p:cSld>
-    <p:spTree>
-      <p:nvGrpSpPr>
-        <p:cNvPr id="1" name=""/>
-        <p:cNvGrpSpPr/>
-        <p:nvPr/>
-      </p:nvGrpSpPr>
-      <p:grpSpPr>
-        <a:xfrm>
-          <a:off x="0" y="0"/>
-          <a:ext cx="0" cy="0"/>
-          <a:chOff x="0" y="0"/>
-          <a:chExt cx="0" cy="0"/>
-        </a:xfrm>
-      </p:grpSpPr>
-      <p:sp>
-        <p:nvSpPr>
-          <p:cNvPr id="3" name="Inhaltsplatzhalter 2"/>
-          <p:cNvSpPr>
-            <a:spLocks noGrp="1"/>
-          </p:cNvSpPr>
-          <p:nvPr>
-            <p:ph idx="1"/>
-          </p:nvPr>
-        </p:nvSpPr>
-        <p:spPr/>
-        <p:txBody>
-          <a:bodyPr/>
-          <a:lstStyle/>
-          <a:p>
-            <a:r>
-              <a:rPr lang="de-DE" dirty="0" smtClean="0"/>
-              <a:t>Anbindung an firmeninterne Datenbanken</a:t>
-            </a:r>
-          </a:p>
-          <a:p>
-            <a:r>
-              <a:rPr lang="de-DE" dirty="0" smtClean="0"/>
-              <a:t>Vorratsprüfung für Rezepte</a:t>
-            </a:r>
-          </a:p>
-          <a:p>
-            <a:r>
-              <a:rPr lang="de-DE" dirty="0" smtClean="0"/>
-              <a:t>Stoffspezifische Bestandsgrenzen</a:t>
-            </a:r>
-          </a:p>
-          <a:p>
-            <a:r>
-              <a:rPr lang="de-DE" dirty="0" smtClean="0"/>
-              <a:t>Ausgabe und Analyse von Verbrauchsstatistiken</a:t>
-            </a:r>
-          </a:p>
-          <a:p>
-            <a:r>
-              <a:rPr lang="de-DE" dirty="0" smtClean="0"/>
-              <a:t>Unterstützung verschiedener </a:t>
-            </a:r>
-            <a:r>
-              <a:rPr lang="de-DE" dirty="0" err="1" smtClean="0"/>
-              <a:t>Waagenmodelle</a:t>
-            </a:r>
-            <a:endParaRPr lang="de-DE" dirty="0" smtClean="0"/>
-          </a:p>
-          <a:p>
-            <a:r>
-              <a:rPr lang="de-DE" dirty="0" smtClean="0"/>
-              <a:t>Drahtlose Übertragung der Einwaagen</a:t>
-            </a:r>
-          </a:p>
-          <a:p>
-            <a:r>
-              <a:rPr lang="de-DE" dirty="0" smtClean="0"/>
-              <a:t>Automatische Erkennung eingewogener Lieferungen</a:t>
-            </a:r>
-          </a:p>
-          <a:p>
-            <a:endParaRPr lang="de-DE" dirty="0"/>
-          </a:p>
-        </p:txBody>
-      </p:sp>
-      <p:sp>
-        <p:nvSpPr>
-          <p:cNvPr id="4" name="Datumsplatzhalter 3"/>
-          <p:cNvSpPr>
-            <a:spLocks noGrp="1"/>
-          </p:cNvSpPr>
-          <p:nvPr>
-            <p:ph type="dt" sz="half" idx="10"/>
-          </p:nvPr>
-        </p:nvSpPr>
-        <p:spPr/>
-        <p:txBody>
-          <a:bodyPr/>
-          <a:lstStyle/>
-          <a:p>
-            <a:r>
-              <a:rPr lang="de-DE" smtClean="0"/>
-              <a:t>01.09.2017</a:t>
-            </a:r>
-            <a:endParaRPr lang="de-DE"/>
-          </a:p>
-        </p:txBody>
-      </p:sp>
-      <p:sp>
-        <p:nvSpPr>
-          <p:cNvPr id="5" name="Fußzeilenplatzhalter 4"/>
-          <p:cNvSpPr>
-            <a:spLocks noGrp="1"/>
-          </p:cNvSpPr>
-          <p:nvPr>
-            <p:ph type="ftr" sz="quarter" idx="11"/>
-          </p:nvPr>
-        </p:nvSpPr>
-        <p:spPr/>
-        <p:txBody>
-          <a:bodyPr/>
-          <a:lstStyle/>
-          <a:p>
-            <a:r>
-              <a:rPr lang="de-DE" smtClean="0"/>
-              <a:t>Martin Schneider, 6000513</a:t>
-            </a:r>
-            <a:endParaRPr lang="de-DE" dirty="0"/>
-          </a:p>
-        </p:txBody>
-      </p:sp>
-      <p:sp>
-        <p:nvSpPr>
-          <p:cNvPr id="6" name="Foliennummernplatzhalter 5"/>
-          <p:cNvSpPr>
-            <a:spLocks noGrp="1"/>
-          </p:cNvSpPr>
-          <p:nvPr>
-            <p:ph type="sldNum" sz="quarter" idx="12"/>
-          </p:nvPr>
-        </p:nvSpPr>
-        <p:spPr/>
-        <p:txBody>
-          <a:bodyPr/>
-          <a:lstStyle/>
-          <a:p>
-            <a:fld id="{166D15F3-9A1A-4AEC-BA89-32D146ECA64D}" type="slidenum">
-              <a:rPr lang="de-DE" smtClean="0"/>
-              <a:t>9</a:t>
-            </a:fld>
-            <a:endParaRPr lang="de-DE"/>
-          </a:p>
-        </p:txBody>
-      </p:sp>
-      <p:sp>
-        <p:nvSpPr>
-          <p:cNvPr id="2" name="Titel 1"/>
-          <p:cNvSpPr>
-            <a:spLocks noGrp="1"/>
-          </p:cNvSpPr>
-          <p:nvPr>
-            <p:ph type="title"/>
-          </p:nvPr>
-        </p:nvSpPr>
-        <p:spPr/>
-        <p:txBody>
-          <a:bodyPr/>
-          <a:lstStyle/>
-          <a:p>
-            <a:r>
-              <a:rPr lang="de-DE" dirty="0" smtClean="0"/>
-              <a:t>4 Ausblick</a:t>
-            </a:r>
-            <a:endParaRPr lang="de-DE" dirty="0"/>
-          </a:p>
-        </p:txBody>
-      </p:sp>
-    </p:spTree>
-    <p:extLst>
-      <p:ext uri="{BB962C8B-B14F-4D97-AF65-F5344CB8AC3E}">
-        <p14:creationId xmlns:p14="http://schemas.microsoft.com/office/powerpoint/2010/main" val="2822618823"/>
       </p:ext>
     </p:extLst>
   </p:cSld>

</xml_diff>